<commit_message>
Apresentação de Ruby sem animações
Retirei as animações
</commit_message>
<xml_diff>
--- a/Apresentação Ruby.pptx
+++ b/Apresentação Ruby.pptx
@@ -231,7 +231,7 @@
           <a:p>
             <a:fld id="{F1729EDE-727D-3448-8C00-59D540E1E22D}" type="datetimeFigureOut">
               <a:rPr lang="pt-BR" smtClean="0"/>
-              <a:t>19/07/17</a:t>
+              <a:t>20/07/17</a:t>
             </a:fld>
             <a:endParaRPr lang="pt-BR"/>
           </a:p>
@@ -1197,7 +1197,7 @@
           <a:p>
             <a:fld id="{AB71333A-03FF-D54F-95C5-B962948F1062}" type="datetime1">
               <a:rPr lang="pt-BR" smtClean="0"/>
-              <a:t>19/07/17</a:t>
+              <a:t>20/07/17</a:t>
             </a:fld>
             <a:endParaRPr lang="pt-BR"/>
           </a:p>
@@ -1362,7 +1362,7 @@
           <a:p>
             <a:fld id="{D9A43AAF-26CA-EC47-881F-D487DA964667}" type="datetime1">
               <a:rPr lang="pt-BR" smtClean="0"/>
-              <a:t>19/07/17</a:t>
+              <a:t>20/07/17</a:t>
             </a:fld>
             <a:endParaRPr lang="pt-BR"/>
           </a:p>
@@ -1537,7 +1537,7 @@
           <a:p>
             <a:fld id="{B5EFF7F1-B87D-684D-A2DA-DF77469BE077}" type="datetime1">
               <a:rPr lang="pt-BR" smtClean="0"/>
-              <a:t>19/07/17</a:t>
+              <a:t>20/07/17</a:t>
             </a:fld>
             <a:endParaRPr lang="pt-BR"/>
           </a:p>
@@ -1702,7 +1702,7 @@
           <a:p>
             <a:fld id="{64113E83-F9A9-A349-B04F-75D692BEED68}" type="datetime1">
               <a:rPr lang="pt-BR" smtClean="0"/>
-              <a:t>19/07/17</a:t>
+              <a:t>20/07/17</a:t>
             </a:fld>
             <a:endParaRPr lang="pt-BR"/>
           </a:p>
@@ -1943,7 +1943,7 @@
           <a:p>
             <a:fld id="{D77A4253-E888-E74E-8827-3B71F3A069C4}" type="datetime1">
               <a:rPr lang="pt-BR" smtClean="0"/>
-              <a:t>19/07/17</a:t>
+              <a:t>20/07/17</a:t>
             </a:fld>
             <a:endParaRPr lang="pt-BR"/>
           </a:p>
@@ -2226,7 +2226,7 @@
           <a:p>
             <a:fld id="{488A1B22-7CA8-1147-9B22-34A800F6F430}" type="datetime1">
               <a:rPr lang="pt-BR" smtClean="0"/>
-              <a:t>19/07/17</a:t>
+              <a:t>20/07/17</a:t>
             </a:fld>
             <a:endParaRPr lang="pt-BR"/>
           </a:p>
@@ -2655,7 +2655,7 @@
           <a:p>
             <a:fld id="{0F9B339D-C48C-524C-A70F-D5AB52DAAEA8}" type="datetime1">
               <a:rPr lang="pt-BR" smtClean="0"/>
-              <a:t>19/07/17</a:t>
+              <a:t>20/07/17</a:t>
             </a:fld>
             <a:endParaRPr lang="pt-BR"/>
           </a:p>
@@ -2768,7 +2768,7 @@
           <a:p>
             <a:fld id="{4EE2BBFD-5AF2-284A-9F2C-3E97771CC867}" type="datetime1">
               <a:rPr lang="pt-BR" smtClean="0"/>
-              <a:t>19/07/17</a:t>
+              <a:t>20/07/17</a:t>
             </a:fld>
             <a:endParaRPr lang="pt-BR"/>
           </a:p>
@@ -2858,7 +2858,7 @@
           <a:p>
             <a:fld id="{906B8272-AB8E-7D41-A93A-F42BEA912981}" type="datetime1">
               <a:rPr lang="pt-BR" smtClean="0"/>
-              <a:t>19/07/17</a:t>
+              <a:t>20/07/17</a:t>
             </a:fld>
             <a:endParaRPr lang="pt-BR"/>
           </a:p>
@@ -3047,7 +3047,7 @@
           <a:p>
             <a:fld id="{6B1F4915-1E30-9041-8F4E-4CE864BFA57D}" type="datetime1">
               <a:rPr lang="pt-BR" smtClean="0"/>
-              <a:t>19/07/17</a:t>
+              <a:t>20/07/17</a:t>
             </a:fld>
             <a:endParaRPr lang="pt-BR"/>
           </a:p>
@@ -3365,7 +3365,7 @@
           <a:p>
             <a:fld id="{0C82F5B5-A3D7-3F49-9FA4-636B9B6C992A}" type="datetime1">
               <a:rPr lang="pt-BR" smtClean="0"/>
-              <a:t>19/07/17</a:t>
+              <a:t>20/07/17</a:t>
             </a:fld>
             <a:endParaRPr lang="pt-BR"/>
           </a:p>
@@ -3744,7 +3744,7 @@
           <a:p>
             <a:fld id="{0BD3E9CC-09BD-A446-9CCB-007A3CD742F3}" type="datetime1">
               <a:rPr lang="pt-BR" smtClean="0"/>
-              <a:t>19/07/17</a:t>
+              <a:t>20/07/17</a:t>
             </a:fld>
             <a:endParaRPr lang="pt-BR"/>
           </a:p>
@@ -4128,6 +4128,9 @@
             <a:pPr algn="ctr"/>
             <a:r>
               <a:rPr lang="pt-BR" dirty="0" smtClean="0">
+                <a:solidFill>
+                  <a:schemeClr val="tx1"/>
+                </a:solidFill>
                 <a:latin typeface="Cambria" charset="0"/>
                 <a:ea typeface="Cambria" charset="0"/>
                 <a:cs typeface="Cambria" charset="0"/>
@@ -4139,6 +4142,9 @@
             <a:pPr algn="ctr"/>
             <a:r>
               <a:rPr lang="pt-BR" dirty="0" smtClean="0">
+                <a:solidFill>
+                  <a:schemeClr val="tx1"/>
+                </a:solidFill>
                 <a:latin typeface="Cambria" charset="0"/>
                 <a:ea typeface="Cambria" charset="0"/>
                 <a:cs typeface="Cambria" charset="0"/>
@@ -4150,6 +4156,9 @@
             <a:pPr algn="ctr"/>
             <a:r>
               <a:rPr lang="pt-BR" dirty="0" err="1" smtClean="0">
+                <a:solidFill>
+                  <a:schemeClr val="tx1"/>
+                </a:solidFill>
                 <a:latin typeface="Cambria" charset="0"/>
                 <a:ea typeface="Cambria" charset="0"/>
                 <a:cs typeface="Cambria" charset="0"/>
@@ -4158,6 +4167,9 @@
             </a:r>
             <a:r>
               <a:rPr lang="pt-BR" dirty="0" smtClean="0">
+                <a:solidFill>
+                  <a:schemeClr val="tx1"/>
+                </a:solidFill>
                 <a:latin typeface="Cambria" charset="0"/>
                 <a:ea typeface="Cambria" charset="0"/>
                 <a:cs typeface="Cambria" charset="0"/>
@@ -4166,6 +4178,9 @@
             </a:r>
             <a:r>
               <a:rPr lang="pt-BR" dirty="0" err="1" smtClean="0">
+                <a:solidFill>
+                  <a:schemeClr val="tx1"/>
+                </a:solidFill>
                 <a:latin typeface="Cambria" charset="0"/>
                 <a:ea typeface="Cambria" charset="0"/>
                 <a:cs typeface="Cambria" charset="0"/>
@@ -4174,6 +4189,9 @@
             </a:r>
             <a:r>
               <a:rPr lang="pt-BR" dirty="0" smtClean="0">
+                <a:solidFill>
+                  <a:schemeClr val="tx1"/>
+                </a:solidFill>
                 <a:latin typeface="Cambria" charset="0"/>
                 <a:ea typeface="Cambria" charset="0"/>
                 <a:cs typeface="Cambria" charset="0"/>
@@ -4182,6 +4200,9 @@
             </a:r>
             <a:r>
               <a:rPr lang="pt-BR" dirty="0" err="1" smtClean="0">
+                <a:solidFill>
+                  <a:schemeClr val="tx1"/>
+                </a:solidFill>
                 <a:latin typeface="Cambria" charset="0"/>
                 <a:ea typeface="Cambria" charset="0"/>
                 <a:cs typeface="Cambria" charset="0"/>
@@ -4189,6 +4210,9 @@
               <a:t>Adjtche</a:t>
             </a:r>
             <a:endParaRPr lang="pt-BR" dirty="0">
+              <a:solidFill>
+                <a:schemeClr val="tx1"/>
+              </a:solidFill>
               <a:latin typeface="Cambria" charset="0"/>
               <a:ea typeface="Cambria" charset="0"/>
               <a:cs typeface="Cambria" charset="0"/>
@@ -4758,6 +4782,9 @@
             <a:r>
               <a:rPr lang="pt-BR" sz="1600" dirty="0">
                 <a:effectLst/>
+                <a:latin typeface="Cambria" charset="0"/>
+                <a:ea typeface="Cambria" charset="0"/>
+                <a:cs typeface="Cambria" charset="0"/>
               </a:rPr>
               <a:t>Herbert Oliveira Rocha</a:t>
             </a:r>
@@ -5578,6 +5605,13 @@
   <p:clrMapOvr>
     <a:masterClrMapping/>
   </p:clrMapOvr>
+  <p:timing>
+    <p:tnLst>
+      <p:par>
+        <p:cTn id="1" dur="indefinite" restart="never" nodeType="tmRoot"/>
+      </p:par>
+    </p:tnLst>
+  </p:timing>
 </p:sld>
 </file>
 
@@ -5988,6 +6022,13 @@
   <p:clrMapOvr>
     <a:masterClrMapping/>
   </p:clrMapOvr>
+  <p:timing>
+    <p:tnLst>
+      <p:par>
+        <p:cTn id="1" dur="indefinite" restart="never" nodeType="tmRoot"/>
+      </p:par>
+    </p:tnLst>
+  </p:timing>
 </p:sld>
 </file>
 
@@ -6299,6 +6340,13 @@
   <p:clrMapOvr>
     <a:masterClrMapping/>
   </p:clrMapOvr>
+  <p:timing>
+    <p:tnLst>
+      <p:par>
+        <p:cTn id="1" dur="indefinite" restart="never" nodeType="tmRoot"/>
+      </p:par>
+    </p:tnLst>
+  </p:timing>
 </p:sld>
 </file>
 
@@ -6608,6 +6656,13 @@
   <p:clrMapOvr>
     <a:masterClrMapping/>
   </p:clrMapOvr>
+  <p:timing>
+    <p:tnLst>
+      <p:par>
+        <p:cTn id="1" dur="indefinite" restart="never" nodeType="tmRoot"/>
+      </p:par>
+    </p:tnLst>
+  </p:timing>
 </p:sld>
 </file>
 
@@ -6895,7 +6950,6 @@
               <a:rPr lang="pt-BR" dirty="0"/>
               <a:t>Escopo (Regras de Visibilidade)</a:t>
             </a:r>
-            <a:endParaRPr lang="pt-BR" dirty="0"/>
           </a:p>
         </p:txBody>
       </p:sp>
@@ -6989,11 +7043,7 @@
             </a:r>
             <a:r>
               <a:rPr lang="pt-BR" sz="2200" dirty="0" smtClean="0"/>
-              <a:t>$</a:t>
-            </a:r>
-            <a:r>
-              <a:rPr lang="pt-BR" sz="2200" dirty="0" smtClean="0"/>
-              <a:t>;</a:t>
+              <a:t>$;</a:t>
             </a:r>
           </a:p>
           <a:p>
@@ -7168,11 +7218,7 @@
           <a:p>
             <a:r>
               <a:rPr lang="pt-BR" sz="2400" dirty="0" smtClean="0"/>
-              <a:t>C</a:t>
-            </a:r>
-            <a:r>
-              <a:rPr lang="pt-BR" sz="2400" dirty="0" smtClean="0"/>
-              <a:t>ódigo 1</a:t>
+              <a:t>Código 1</a:t>
             </a:r>
             <a:endParaRPr lang="pt-BR" sz="2400" dirty="0"/>
           </a:p>
@@ -7488,11 +7534,7 @@
             </a:r>
             <a:r>
               <a:rPr lang="pt-BR" dirty="0"/>
-              <a:t> teste();</a:t>
-            </a:r>
-            <a:r>
-              <a:rPr lang="pt-BR" dirty="0"/>
-              <a:t> </a:t>
+              <a:t> teste(); </a:t>
             </a:r>
           </a:p>
         </p:txBody>
@@ -7530,6 +7572,13 @@
   <p:clrMapOvr>
     <a:masterClrMapping/>
   </p:clrMapOvr>
+  <p:timing>
+    <p:tnLst>
+      <p:par>
+        <p:cTn id="1" dur="indefinite" restart="never" nodeType="tmRoot"/>
+      </p:par>
+    </p:tnLst>
+  </p:timing>
 </p:sld>
 </file>
 
@@ -7760,6 +7809,13 @@
   <p:clrMapOvr>
     <a:masterClrMapping/>
   </p:clrMapOvr>
+  <p:timing>
+    <p:tnLst>
+      <p:par>
+        <p:cTn id="1" dur="indefinite" restart="never" nodeType="tmRoot"/>
+      </p:par>
+    </p:tnLst>
+  </p:timing>
 </p:sld>
 </file>
 
@@ -8190,6 +8246,13 @@
   <p:clrMapOvr>
     <a:masterClrMapping/>
   </p:clrMapOvr>
+  <p:timing>
+    <p:tnLst>
+      <p:par>
+        <p:cTn id="1" dur="indefinite" restart="never" nodeType="tmRoot"/>
+      </p:par>
+    </p:tnLst>
+  </p:timing>
 </p:sld>
 </file>
 
@@ -8405,6 +8468,13 @@
   <p:clrMapOvr>
     <a:masterClrMapping/>
   </p:clrMapOvr>
+  <p:timing>
+    <p:tnLst>
+      <p:par>
+        <p:cTn id="1" dur="indefinite" restart="never" nodeType="tmRoot"/>
+      </p:par>
+    </p:tnLst>
+  </p:timing>
 </p:sld>
 </file>
 
@@ -8443,11 +8513,7 @@
             <a:pPr algn="ctr"/>
             <a:r>
               <a:rPr lang="pt-BR" dirty="0" smtClean="0"/>
-              <a:t>Hist</a:t>
-            </a:r>
-            <a:r>
-              <a:rPr lang="pt-BR" dirty="0" smtClean="0"/>
-              <a:t>órico</a:t>
+              <a:t>Histórico</a:t>
             </a:r>
             <a:endParaRPr lang="pt-BR" dirty="0"/>
           </a:p>
@@ -8478,11 +8544,7 @@
             <a:pPr algn="just"/>
             <a:r>
               <a:rPr lang="pt-BR" sz="2400" dirty="0" smtClean="0"/>
-              <a:t>O que </a:t>
-            </a:r>
-            <a:r>
-              <a:rPr lang="pt-BR" sz="2400" dirty="0" smtClean="0"/>
-              <a:t>é </a:t>
+              <a:t>O que é </a:t>
             </a:r>
             <a:r>
               <a:rPr lang="pt-BR" sz="2400" dirty="0" err="1" smtClean="0"/>
@@ -8501,11 +8563,7 @@
             <a:pPr algn="just"/>
             <a:r>
               <a:rPr lang="pt-BR" sz="2400" dirty="0" smtClean="0"/>
-              <a:t>Criada em 1993, no Japão, </a:t>
-            </a:r>
-            <a:r>
-              <a:rPr lang="pt-BR" sz="2400" dirty="0" smtClean="0"/>
-              <a:t>por</a:t>
+              <a:t>Criada em 1993, no Japão, por</a:t>
             </a:r>
             <a:r>
               <a:rPr lang="pt-BR" sz="2400" dirty="0"/>
@@ -8535,7 +8593,6 @@
               <a:rPr lang="pt-BR" sz="2400" dirty="0" smtClean="0"/>
               <a:t>script;</a:t>
             </a:r>
-            <a:endParaRPr lang="pt-BR" sz="2400" dirty="0" smtClean="0"/>
           </a:p>
           <a:p>
             <a:pPr algn="just"/>
@@ -8754,274 +8811,7 @@
   <p:timing>
     <p:tnLst>
       <p:par>
-        <p:cTn id="1" dur="indefinite" restart="never" nodeType="tmRoot">
-          <p:childTnLst>
-            <p:seq concurrent="1" nextAc="seek">
-              <p:cTn id="2" dur="indefinite" nodeType="mainSeq">
-                <p:childTnLst>
-                  <p:par>
-                    <p:cTn id="3" fill="hold">
-                      <p:stCondLst>
-                        <p:cond delay="indefinite"/>
-                      </p:stCondLst>
-                      <p:childTnLst>
-                        <p:par>
-                          <p:cTn id="4" fill="hold">
-                            <p:stCondLst>
-                              <p:cond delay="0"/>
-                            </p:stCondLst>
-                            <p:childTnLst>
-                              <p:par>
-                                <p:cTn id="5" presetID="16" presetClass="entr" presetSubtype="21" fill="hold" nodeType="clickEffect">
-                                  <p:stCondLst>
-                                    <p:cond delay="0"/>
-                                  </p:stCondLst>
-                                  <p:childTnLst>
-                                    <p:set>
-                                      <p:cBhvr>
-                                        <p:cTn id="6" dur="1" fill="hold">
-                                          <p:stCondLst>
-                                            <p:cond delay="0"/>
-                                          </p:stCondLst>
-                                        </p:cTn>
-                                        <p:tgtEl>
-                                          <p:spTgt spid="3">
-                                            <p:txEl>
-                                              <p:pRg st="0" end="0"/>
-                                            </p:txEl>
-                                          </p:spTgt>
-                                        </p:tgtEl>
-                                        <p:attrNameLst>
-                                          <p:attrName>style.visibility</p:attrName>
-                                        </p:attrNameLst>
-                                      </p:cBhvr>
-                                      <p:to>
-                                        <p:strVal val="visible"/>
-                                      </p:to>
-                                    </p:set>
-                                    <p:animEffect transition="in" filter="barn(inVertical)">
-                                      <p:cBhvr>
-                                        <p:cTn id="7" dur="500"/>
-                                        <p:tgtEl>
-                                          <p:spTgt spid="3">
-                                            <p:txEl>
-                                              <p:pRg st="0" end="0"/>
-                                            </p:txEl>
-                                          </p:spTgt>
-                                        </p:tgtEl>
-                                      </p:cBhvr>
-                                    </p:animEffect>
-                                  </p:childTnLst>
-                                </p:cTn>
-                              </p:par>
-                            </p:childTnLst>
-                          </p:cTn>
-                        </p:par>
-                      </p:childTnLst>
-                    </p:cTn>
-                  </p:par>
-                  <p:par>
-                    <p:cTn id="8" fill="hold">
-                      <p:stCondLst>
-                        <p:cond delay="indefinite"/>
-                      </p:stCondLst>
-                      <p:childTnLst>
-                        <p:par>
-                          <p:cTn id="9" fill="hold">
-                            <p:stCondLst>
-                              <p:cond delay="0"/>
-                            </p:stCondLst>
-                            <p:childTnLst>
-                              <p:par>
-                                <p:cTn id="10" presetID="16" presetClass="entr" presetSubtype="21" fill="hold" nodeType="clickEffect">
-                                  <p:stCondLst>
-                                    <p:cond delay="0"/>
-                                  </p:stCondLst>
-                                  <p:childTnLst>
-                                    <p:set>
-                                      <p:cBhvr>
-                                        <p:cTn id="11" dur="1" fill="hold">
-                                          <p:stCondLst>
-                                            <p:cond delay="0"/>
-                                          </p:stCondLst>
-                                        </p:cTn>
-                                        <p:tgtEl>
-                                          <p:spTgt spid="3">
-                                            <p:txEl>
-                                              <p:pRg st="2" end="2"/>
-                                            </p:txEl>
-                                          </p:spTgt>
-                                        </p:tgtEl>
-                                        <p:attrNameLst>
-                                          <p:attrName>style.visibility</p:attrName>
-                                        </p:attrNameLst>
-                                      </p:cBhvr>
-                                      <p:to>
-                                        <p:strVal val="visible"/>
-                                      </p:to>
-                                    </p:set>
-                                    <p:animEffect transition="in" filter="barn(inVertical)">
-                                      <p:cBhvr>
-                                        <p:cTn id="12" dur="500"/>
-                                        <p:tgtEl>
-                                          <p:spTgt spid="3">
-                                            <p:txEl>
-                                              <p:pRg st="2" end="2"/>
-                                            </p:txEl>
-                                          </p:spTgt>
-                                        </p:tgtEl>
-                                      </p:cBhvr>
-                                    </p:animEffect>
-                                  </p:childTnLst>
-                                </p:cTn>
-                              </p:par>
-                            </p:childTnLst>
-                          </p:cTn>
-                        </p:par>
-                      </p:childTnLst>
-                    </p:cTn>
-                  </p:par>
-                  <p:par>
-                    <p:cTn id="13" fill="hold">
-                      <p:stCondLst>
-                        <p:cond delay="indefinite"/>
-                      </p:stCondLst>
-                      <p:childTnLst>
-                        <p:par>
-                          <p:cTn id="14" fill="hold">
-                            <p:stCondLst>
-                              <p:cond delay="0"/>
-                            </p:stCondLst>
-                            <p:childTnLst>
-                              <p:par>
-                                <p:cTn id="15" presetID="16" presetClass="entr" presetSubtype="21" fill="hold" nodeType="clickEffect">
-                                  <p:stCondLst>
-                                    <p:cond delay="0"/>
-                                  </p:stCondLst>
-                                  <p:childTnLst>
-                                    <p:set>
-                                      <p:cBhvr>
-                                        <p:cTn id="16" dur="1" fill="hold">
-                                          <p:stCondLst>
-                                            <p:cond delay="0"/>
-                                          </p:stCondLst>
-                                        </p:cTn>
-                                        <p:tgtEl>
-                                          <p:spTgt spid="3">
-                                            <p:txEl>
-                                              <p:pRg st="4" end="4"/>
-                                            </p:txEl>
-                                          </p:spTgt>
-                                        </p:tgtEl>
-                                        <p:attrNameLst>
-                                          <p:attrName>style.visibility</p:attrName>
-                                        </p:attrNameLst>
-                                      </p:cBhvr>
-                                      <p:to>
-                                        <p:strVal val="visible"/>
-                                      </p:to>
-                                    </p:set>
-                                    <p:animEffect transition="in" filter="barn(inVertical)">
-                                      <p:cBhvr>
-                                        <p:cTn id="17" dur="500"/>
-                                        <p:tgtEl>
-                                          <p:spTgt spid="3">
-                                            <p:txEl>
-                                              <p:pRg st="4" end="4"/>
-                                            </p:txEl>
-                                          </p:spTgt>
-                                        </p:tgtEl>
-                                      </p:cBhvr>
-                                    </p:animEffect>
-                                  </p:childTnLst>
-                                </p:cTn>
-                              </p:par>
-                            </p:childTnLst>
-                          </p:cTn>
-                        </p:par>
-                      </p:childTnLst>
-                    </p:cTn>
-                  </p:par>
-                  <p:par>
-                    <p:cTn id="18" fill="hold">
-                      <p:stCondLst>
-                        <p:cond delay="indefinite"/>
-                      </p:stCondLst>
-                      <p:childTnLst>
-                        <p:par>
-                          <p:cTn id="19" fill="hold">
-                            <p:stCondLst>
-                              <p:cond delay="0"/>
-                            </p:stCondLst>
-                            <p:childTnLst>
-                              <p:par>
-                                <p:cTn id="20" presetID="16" presetClass="entr" presetSubtype="21" fill="hold" nodeType="clickEffect">
-                                  <p:stCondLst>
-                                    <p:cond delay="0"/>
-                                  </p:stCondLst>
-                                  <p:childTnLst>
-                                    <p:set>
-                                      <p:cBhvr>
-                                        <p:cTn id="21" dur="1" fill="hold">
-                                          <p:stCondLst>
-                                            <p:cond delay="0"/>
-                                          </p:stCondLst>
-                                        </p:cTn>
-                                        <p:tgtEl>
-                                          <p:spTgt spid="3">
-                                            <p:txEl>
-                                              <p:pRg st="6" end="6"/>
-                                            </p:txEl>
-                                          </p:spTgt>
-                                        </p:tgtEl>
-                                        <p:attrNameLst>
-                                          <p:attrName>style.visibility</p:attrName>
-                                        </p:attrNameLst>
-                                      </p:cBhvr>
-                                      <p:to>
-                                        <p:strVal val="visible"/>
-                                      </p:to>
-                                    </p:set>
-                                    <p:animEffect transition="in" filter="barn(inVertical)">
-                                      <p:cBhvr>
-                                        <p:cTn id="22" dur="500"/>
-                                        <p:tgtEl>
-                                          <p:spTgt spid="3">
-                                            <p:txEl>
-                                              <p:pRg st="6" end="6"/>
-                                            </p:txEl>
-                                          </p:spTgt>
-                                        </p:tgtEl>
-                                      </p:cBhvr>
-                                    </p:animEffect>
-                                  </p:childTnLst>
-                                </p:cTn>
-                              </p:par>
-                            </p:childTnLst>
-                          </p:cTn>
-                        </p:par>
-                      </p:childTnLst>
-                    </p:cTn>
-                  </p:par>
-                </p:childTnLst>
-              </p:cTn>
-              <p:prevCondLst>
-                <p:cond evt="onPrev" delay="0">
-                  <p:tgtEl>
-                    <p:sldTgt/>
-                  </p:tgtEl>
-                </p:cond>
-              </p:prevCondLst>
-              <p:nextCondLst>
-                <p:cond evt="onNext" delay="0">
-                  <p:tgtEl>
-                    <p:sldTgt/>
-                  </p:tgtEl>
-                </p:cond>
-              </p:nextCondLst>
-            </p:seq>
-          </p:childTnLst>
-        </p:cTn>
+        <p:cTn id="1" dur="indefinite" restart="never" nodeType="tmRoot"/>
       </p:par>
     </p:tnLst>
   </p:timing>
@@ -9444,6 +9234,13 @@
   <p:clrMapOvr>
     <a:masterClrMapping/>
   </p:clrMapOvr>
+  <p:timing>
+    <p:tnLst>
+      <p:par>
+        <p:cTn id="1" dur="indefinite" restart="never" nodeType="tmRoot"/>
+      </p:par>
+    </p:tnLst>
+  </p:timing>
 </p:sld>
 </file>
 
@@ -9592,11 +9389,7 @@
             <a:pPr lvl="1"/>
             <a:r>
               <a:rPr lang="pt-BR" dirty="0" smtClean="0"/>
-              <a:t>Limitaç</a:t>
-            </a:r>
-            <a:r>
-              <a:rPr lang="pt-BR" dirty="0" smtClean="0"/>
-              <a:t>ões.</a:t>
+              <a:t>Limitações.</a:t>
             </a:r>
           </a:p>
           <a:p>
@@ -9610,11 +9403,7 @@
             </a:r>
             <a:r>
               <a:rPr lang="pt-BR" dirty="0" err="1" smtClean="0"/>
-              <a:t>Aprimoraç</a:t>
-            </a:r>
-            <a:r>
-              <a:rPr lang="pt-BR" dirty="0" err="1" smtClean="0"/>
-              <a:t>ões</a:t>
+              <a:t>Aprimorações</a:t>
             </a:r>
             <a:r>
               <a:rPr lang="pt-BR" dirty="0" smtClean="0"/>
@@ -9627,7 +9416,6 @@
               <a:rPr lang="pt-BR" dirty="0" smtClean="0"/>
               <a:t>Site, Web, Mobile.</a:t>
             </a:r>
-            <a:endParaRPr lang="pt-BR" dirty="0" smtClean="0"/>
           </a:p>
           <a:p>
             <a:endParaRPr lang="pt-BR" dirty="0"/>
@@ -9701,6 +9489,13 @@
   <p:clrMapOvr>
     <a:masterClrMapping/>
   </p:clrMapOvr>
+  <p:timing>
+    <p:tnLst>
+      <p:par>
+        <p:cTn id="1" dur="indefinite" restart="never" nodeType="tmRoot"/>
+      </p:par>
+    </p:tnLst>
+  </p:timing>
 </p:sld>
 </file>
 
@@ -10512,11 +10307,7 @@
             <a:pPr algn="ctr"/>
             <a:r>
               <a:rPr lang="pt-BR" dirty="0" smtClean="0"/>
-              <a:t>Hist</a:t>
-            </a:r>
-            <a:r>
-              <a:rPr lang="pt-BR" dirty="0" smtClean="0"/>
-              <a:t>órico</a:t>
+              <a:t>Histórico</a:t>
             </a:r>
             <a:endParaRPr lang="pt-BR" dirty="0"/>
           </a:p>
@@ -10567,13 +10358,8 @@
             </a:r>
             <a:r>
               <a:rPr lang="pt-BR" sz="2400" dirty="0"/>
-              <a:t>, sendo muito similar em vários aspectos a </a:t>
-            </a:r>
-            <a:r>
-              <a:rPr lang="pt-BR" sz="2400" dirty="0"/>
-              <a:t>Python;</a:t>
-            </a:r>
-            <a:endParaRPr lang="pt-BR" sz="2400" dirty="0"/>
+              <a:t>, sendo muito similar em vários aspectos a Python;</a:t>
+            </a:r>
           </a:p>
           <a:p>
             <a:pPr algn="just"/>
@@ -10762,213 +10548,7 @@
   <p:timing>
     <p:tnLst>
       <p:par>
-        <p:cTn id="1" dur="indefinite" restart="never" nodeType="tmRoot">
-          <p:childTnLst>
-            <p:seq concurrent="1" nextAc="seek">
-              <p:cTn id="2" dur="indefinite" nodeType="mainSeq">
-                <p:childTnLst>
-                  <p:par>
-                    <p:cTn id="3" fill="hold">
-                      <p:stCondLst>
-                        <p:cond delay="indefinite"/>
-                      </p:stCondLst>
-                      <p:childTnLst>
-                        <p:par>
-                          <p:cTn id="4" fill="hold">
-                            <p:stCondLst>
-                              <p:cond delay="0"/>
-                            </p:stCondLst>
-                            <p:childTnLst>
-                              <p:par>
-                                <p:cTn id="5" presetID="16" presetClass="entr" presetSubtype="21" fill="hold" nodeType="clickEffect">
-                                  <p:stCondLst>
-                                    <p:cond delay="0"/>
-                                  </p:stCondLst>
-                                  <p:childTnLst>
-                                    <p:set>
-                                      <p:cBhvr>
-                                        <p:cTn id="6" dur="1" fill="hold">
-                                          <p:stCondLst>
-                                            <p:cond delay="0"/>
-                                          </p:stCondLst>
-                                        </p:cTn>
-                                        <p:tgtEl>
-                                          <p:spTgt spid="3">
-                                            <p:txEl>
-                                              <p:pRg st="0" end="0"/>
-                                            </p:txEl>
-                                          </p:spTgt>
-                                        </p:tgtEl>
-                                        <p:attrNameLst>
-                                          <p:attrName>style.visibility</p:attrName>
-                                        </p:attrNameLst>
-                                      </p:cBhvr>
-                                      <p:to>
-                                        <p:strVal val="visible"/>
-                                      </p:to>
-                                    </p:set>
-                                    <p:animEffect transition="in" filter="barn(inVertical)">
-                                      <p:cBhvr>
-                                        <p:cTn id="7" dur="500"/>
-                                        <p:tgtEl>
-                                          <p:spTgt spid="3">
-                                            <p:txEl>
-                                              <p:pRg st="0" end="0"/>
-                                            </p:txEl>
-                                          </p:spTgt>
-                                        </p:tgtEl>
-                                      </p:cBhvr>
-                                    </p:animEffect>
-                                  </p:childTnLst>
-                                </p:cTn>
-                              </p:par>
-                            </p:childTnLst>
-                          </p:cTn>
-                        </p:par>
-                      </p:childTnLst>
-                    </p:cTn>
-                  </p:par>
-                  <p:par>
-                    <p:cTn id="8" fill="hold">
-                      <p:stCondLst>
-                        <p:cond delay="indefinite"/>
-                      </p:stCondLst>
-                      <p:childTnLst>
-                        <p:par>
-                          <p:cTn id="9" fill="hold">
-                            <p:stCondLst>
-                              <p:cond delay="0"/>
-                            </p:stCondLst>
-                            <p:childTnLst>
-                              <p:par>
-                                <p:cTn id="10" presetID="16" presetClass="entr" presetSubtype="21" fill="hold" nodeType="clickEffect">
-                                  <p:stCondLst>
-                                    <p:cond delay="0"/>
-                                  </p:stCondLst>
-                                  <p:childTnLst>
-                                    <p:set>
-                                      <p:cBhvr>
-                                        <p:cTn id="11" dur="1" fill="hold">
-                                          <p:stCondLst>
-                                            <p:cond delay="0"/>
-                                          </p:stCondLst>
-                                        </p:cTn>
-                                        <p:tgtEl>
-                                          <p:spTgt spid="3">
-                                            <p:txEl>
-                                              <p:pRg st="2" end="2"/>
-                                            </p:txEl>
-                                          </p:spTgt>
-                                        </p:tgtEl>
-                                        <p:attrNameLst>
-                                          <p:attrName>style.visibility</p:attrName>
-                                        </p:attrNameLst>
-                                      </p:cBhvr>
-                                      <p:to>
-                                        <p:strVal val="visible"/>
-                                      </p:to>
-                                    </p:set>
-                                    <p:animEffect transition="in" filter="barn(inVertical)">
-                                      <p:cBhvr>
-                                        <p:cTn id="12" dur="500"/>
-                                        <p:tgtEl>
-                                          <p:spTgt spid="3">
-                                            <p:txEl>
-                                              <p:pRg st="2" end="2"/>
-                                            </p:txEl>
-                                          </p:spTgt>
-                                        </p:tgtEl>
-                                      </p:cBhvr>
-                                    </p:animEffect>
-                                  </p:childTnLst>
-                                </p:cTn>
-                              </p:par>
-                            </p:childTnLst>
-                          </p:cTn>
-                        </p:par>
-                      </p:childTnLst>
-                    </p:cTn>
-                  </p:par>
-                  <p:par>
-                    <p:cTn id="13" fill="hold">
-                      <p:stCondLst>
-                        <p:cond delay="indefinite"/>
-                      </p:stCondLst>
-                      <p:childTnLst>
-                        <p:par>
-                          <p:cTn id="14" fill="hold">
-                            <p:stCondLst>
-                              <p:cond delay="0"/>
-                            </p:stCondLst>
-                            <p:childTnLst>
-                              <p:par>
-                                <p:cTn id="15" presetID="16" presetClass="entr" presetSubtype="21" fill="hold" nodeType="clickEffect">
-                                  <p:stCondLst>
-                                    <p:cond delay="0"/>
-                                  </p:stCondLst>
-                                  <p:childTnLst>
-                                    <p:set>
-                                      <p:cBhvr>
-                                        <p:cTn id="16" dur="1" fill="hold">
-                                          <p:stCondLst>
-                                            <p:cond delay="0"/>
-                                          </p:stCondLst>
-                                        </p:cTn>
-                                        <p:tgtEl>
-                                          <p:spTgt spid="3">
-                                            <p:txEl>
-                                              <p:pRg st="4" end="4"/>
-                                            </p:txEl>
-                                          </p:spTgt>
-                                        </p:tgtEl>
-                                        <p:attrNameLst>
-                                          <p:attrName>style.visibility</p:attrName>
-                                        </p:attrNameLst>
-                                      </p:cBhvr>
-                                      <p:to>
-                                        <p:strVal val="visible"/>
-                                      </p:to>
-                                    </p:set>
-                                    <p:animEffect transition="in" filter="barn(inVertical)">
-                                      <p:cBhvr>
-                                        <p:cTn id="17" dur="500"/>
-                                        <p:tgtEl>
-                                          <p:spTgt spid="3">
-                                            <p:txEl>
-                                              <p:pRg st="4" end="4"/>
-                                            </p:txEl>
-                                          </p:spTgt>
-                                        </p:tgtEl>
-                                      </p:cBhvr>
-                                    </p:animEffect>
-                                  </p:childTnLst>
-                                </p:cTn>
-                              </p:par>
-                            </p:childTnLst>
-                          </p:cTn>
-                        </p:par>
-                      </p:childTnLst>
-                    </p:cTn>
-                  </p:par>
-                </p:childTnLst>
-              </p:cTn>
-              <p:prevCondLst>
-                <p:cond evt="onPrev" delay="0">
-                  <p:tgtEl>
-                    <p:sldTgt/>
-                  </p:tgtEl>
-                </p:cond>
-              </p:prevCondLst>
-              <p:nextCondLst>
-                <p:cond evt="onNext" delay="0">
-                  <p:tgtEl>
-                    <p:sldTgt/>
-                  </p:tgtEl>
-                </p:cond>
-              </p:nextCondLst>
-            </p:seq>
-          </p:childTnLst>
-        </p:cTn>
+        <p:cTn id="1" dur="indefinite" restart="never" nodeType="tmRoot"/>
       </p:par>
     </p:tnLst>
   </p:timing>
@@ -11014,11 +10594,7 @@
             </a:r>
             <a:r>
               <a:rPr lang="pt-BR" dirty="0" smtClean="0"/>
-              <a:t>om</a:t>
-            </a:r>
-            <a:r>
-              <a:rPr lang="pt-BR" dirty="0" smtClean="0"/>
-              <a:t>ínios de Aplicação</a:t>
+              <a:t>omínios de Aplicação</a:t>
             </a:r>
             <a:endParaRPr lang="pt-BR" dirty="0"/>
           </a:p>
@@ -11385,11 +10961,7 @@
             </a:r>
             <a:r>
               <a:rPr lang="pt-BR" dirty="0" smtClean="0"/>
-              <a:t>om</a:t>
-            </a:r>
-            <a:r>
-              <a:rPr lang="pt-BR" dirty="0" smtClean="0"/>
-              <a:t>ínios de Aplicação</a:t>
+              <a:t>omínios de Aplicação</a:t>
             </a:r>
             <a:endParaRPr lang="pt-BR" dirty="0"/>
           </a:p>
@@ -12117,6 +11689,13 @@
   <p:clrMapOvr>
     <a:masterClrMapping/>
   </p:clrMapOvr>
+  <p:timing>
+    <p:tnLst>
+      <p:par>
+        <p:cTn id="1" dur="indefinite" restart="never" nodeType="tmRoot"/>
+      </p:par>
+    </p:tnLst>
+  </p:timing>
 </p:sld>
 </file>
 
@@ -12592,6 +12171,13 @@
   <p:clrMapOvr>
     <a:masterClrMapping/>
   </p:clrMapOvr>
+  <p:timing>
+    <p:tnLst>
+      <p:par>
+        <p:cTn id="1" dur="indefinite" restart="never" nodeType="tmRoot"/>
+      </p:par>
+    </p:tnLst>
+  </p:timing>
 </p:sld>
 </file>
 
@@ -12630,11 +12216,7 @@
             <a:pPr algn="ctr"/>
             <a:r>
               <a:rPr lang="pt-BR" dirty="0" smtClean="0"/>
-              <a:t>Vari</a:t>
-            </a:r>
-            <a:r>
-              <a:rPr lang="pt-BR" dirty="0" smtClean="0"/>
-              <a:t>áveis e Tipos de Dados</a:t>
+              <a:t>Variáveis e Tipos de Dados</a:t>
             </a:r>
             <a:endParaRPr lang="pt-BR" dirty="0"/>
           </a:p>
@@ -14276,6 +13858,13 @@
   <p:clrMapOvr>
     <a:masterClrMapping/>
   </p:clrMapOvr>
+  <p:timing>
+    <p:tnLst>
+      <p:par>
+        <p:cTn id="1" dur="indefinite" restart="never" nodeType="tmRoot"/>
+      </p:par>
+    </p:tnLst>
+  </p:timing>
 </p:sld>
 </file>
 

</xml_diff>